<commit_message>
Switch js to CamelCase
</commit_message>
<xml_diff>
--- a/docs/concept.pptx
+++ b/docs/concept.pptx
@@ -11,9 +11,10 @@
     <p:sldId id="259" r:id="rId5"/>
     <p:sldId id="263" r:id="rId6"/>
     <p:sldId id="264" r:id="rId7"/>
-    <p:sldId id="265" r:id="rId8"/>
-    <p:sldId id="260" r:id="rId9"/>
-    <p:sldId id="266" r:id="rId10"/>
+    <p:sldId id="267" r:id="rId8"/>
+    <p:sldId id="265" r:id="rId9"/>
+    <p:sldId id="260" r:id="rId10"/>
+    <p:sldId id="266" r:id="rId11"/>
   </p:sldIdLst>
   <p:sldSz cx="12192000" cy="6858000"/>
   <p:notesSz cx="6858000" cy="9144000"/>
@@ -127,6 +128,7 @@
           <p14:sldIdLst>
             <p14:sldId id="263"/>
             <p14:sldId id="264"/>
+            <p14:sldId id="267"/>
             <p14:sldId id="265"/>
             <p14:sldId id="260"/>
             <p14:sldId id="266"/>
@@ -7758,6 +7760,152 @@
 </p:sld>
 </file>
 
+<file path=ppt/slides/slide10.xml><?xml version="1.0" encoding="utf-8"?>
+<p:sld xmlns:a="http://schemas.openxmlformats.org/drawingml/2006/main" xmlns:r="http://schemas.openxmlformats.org/officeDocument/2006/relationships" xmlns:p="http://schemas.openxmlformats.org/presentationml/2006/main">
+  <p:cSld>
+    <p:spTree>
+      <p:nvGrpSpPr>
+        <p:cNvPr id="1" name="">
+          <a:extLst>
+            <a:ext uri="{FF2B5EF4-FFF2-40B4-BE49-F238E27FC236}">
+              <a16:creationId xmlns:a16="http://schemas.microsoft.com/office/drawing/2014/main" id="{FD87F7AA-21A8-0B25-AE9D-026A87963249}"/>
+            </a:ext>
+          </a:extLst>
+        </p:cNvPr>
+        <p:cNvGrpSpPr/>
+        <p:nvPr/>
+      </p:nvGrpSpPr>
+      <p:grpSpPr>
+        <a:xfrm>
+          <a:off x="0" y="0"/>
+          <a:ext cx="0" cy="0"/>
+          <a:chOff x="0" y="0"/>
+          <a:chExt cx="0" cy="0"/>
+        </a:xfrm>
+      </p:grpSpPr>
+      <p:sp>
+        <p:nvSpPr>
+          <p:cNvPr id="2" name="Titel 1">
+            <a:extLst>
+              <a:ext uri="{FF2B5EF4-FFF2-40B4-BE49-F238E27FC236}">
+                <a16:creationId xmlns:a16="http://schemas.microsoft.com/office/drawing/2014/main" id="{FC7CEAED-74F4-03EE-8298-0990175690EC}"/>
+              </a:ext>
+            </a:extLst>
+          </p:cNvPr>
+          <p:cNvSpPr>
+            <a:spLocks noGrp="1"/>
+          </p:cNvSpPr>
+          <p:nvPr>
+            <p:ph type="title"/>
+          </p:nvPr>
+        </p:nvSpPr>
+        <p:spPr>
+          <a:xfrm>
+            <a:off x="838202" y="4933"/>
+            <a:ext cx="10515600" cy="1458119"/>
+          </a:xfrm>
+        </p:spPr>
+        <p:txBody>
+          <a:bodyPr/>
+          <a:lstStyle/>
+          <a:p>
+            <a:r>
+              <a:rPr lang="en-US" b="1" dirty="0">
+                <a:solidFill>
+                  <a:schemeClr val="bg1"/>
+                </a:solidFill>
+              </a:rPr>
+              <a:t>Build (CI/CD)</a:t>
+            </a:r>
+            <a:endParaRPr lang="nl-BE" b="1" dirty="0">
+              <a:solidFill>
+                <a:schemeClr val="bg1"/>
+              </a:solidFill>
+            </a:endParaRPr>
+          </a:p>
+        </p:txBody>
+      </p:sp>
+      <p:sp>
+        <p:nvSpPr>
+          <p:cNvPr id="5" name="Tijdelijke aanduiding voor inhoud 4">
+            <a:extLst>
+              <a:ext uri="{FF2B5EF4-FFF2-40B4-BE49-F238E27FC236}">
+                <a16:creationId xmlns:a16="http://schemas.microsoft.com/office/drawing/2014/main" id="{48598F20-39A3-FD2B-F24A-0914884E4B85}"/>
+              </a:ext>
+            </a:extLst>
+          </p:cNvPr>
+          <p:cNvSpPr>
+            <a:spLocks noGrp="1"/>
+          </p:cNvSpPr>
+          <p:nvPr>
+            <p:ph idx="1"/>
+          </p:nvPr>
+        </p:nvSpPr>
+        <p:spPr/>
+        <p:txBody>
+          <a:bodyPr/>
+          <a:lstStyle/>
+          <a:p>
+            <a:r>
+              <a:rPr lang="en-US" dirty="0">
+                <a:solidFill>
+                  <a:schemeClr val="bg1"/>
+                </a:solidFill>
+              </a:rPr>
+              <a:t>Checks?</a:t>
+            </a:r>
+          </a:p>
+          <a:p>
+            <a:r>
+              <a:rPr lang="en-US" dirty="0">
+                <a:solidFill>
+                  <a:schemeClr val="bg1"/>
+                </a:solidFill>
+              </a:rPr>
+              <a:t>Build for Mobile</a:t>
+            </a:r>
+          </a:p>
+          <a:p>
+            <a:r>
+              <a:rPr lang="en-US" dirty="0">
+                <a:solidFill>
+                  <a:schemeClr val="bg1"/>
+                </a:solidFill>
+              </a:rPr>
+              <a:t>Build for Web browser (</a:t>
+            </a:r>
+            <a:r>
+              <a:rPr lang="en-US" dirty="0" err="1">
+                <a:solidFill>
+                  <a:schemeClr val="bg1"/>
+                </a:solidFill>
+              </a:rPr>
+              <a:t>manifest.json</a:t>
+            </a:r>
+            <a:r>
+              <a:rPr lang="en-US" dirty="0">
+                <a:solidFill>
+                  <a:schemeClr val="bg1"/>
+                </a:solidFill>
+              </a:rPr>
+              <a:t>)</a:t>
+            </a:r>
+          </a:p>
+        </p:txBody>
+      </p:sp>
+    </p:spTree>
+    <p:extLst>
+      <p:ext uri="{BB962C8B-B14F-4D97-AF65-F5344CB8AC3E}">
+        <p14:creationId xmlns:p14="http://schemas.microsoft.com/office/powerpoint/2010/main" val="4118606538"/>
+      </p:ext>
+    </p:extLst>
+  </p:cSld>
+  <p:clrMapOvr>
+    <a:masterClrMapping/>
+  </p:clrMapOvr>
+</p:sld>
+</file>
+
 <file path=ppt/slides/slide2.xml><?xml version="1.0" encoding="utf-8"?>
 <p:sld xmlns:a="http://schemas.openxmlformats.org/drawingml/2006/main" xmlns:r="http://schemas.openxmlformats.org/officeDocument/2006/relationships" xmlns:p="http://schemas.openxmlformats.org/presentationml/2006/main" show="0">
   <p:cSld>
@@ -7838,8 +7986,8 @@
         </p:nvSpPr>
         <p:spPr>
           <a:xfrm>
-            <a:off x="3685467" y="324546"/>
-            <a:ext cx="1611086" cy="336467"/>
+            <a:off x="3690547" y="355618"/>
+            <a:ext cx="437800" cy="336467"/>
           </a:xfrm>
           <a:prstGeom prst="roundRect">
             <a:avLst/>
@@ -7878,12 +8026,12 @@
           <a:p>
             <a:pPr algn="ctr"/>
             <a:r>
-              <a:rPr lang="en-US" sz="1801" dirty="0" err="1">
+              <a:rPr lang="en-US" sz="1801" dirty="0">
                 <a:solidFill>
                   <a:schemeClr val="tx1"/>
                 </a:solidFill>
               </a:rPr>
-              <a:t>Maandag</a:t>
+              <a:t>M</a:t>
             </a:r>
             <a:endParaRPr lang="nl-BE" sz="1801" dirty="0">
               <a:solidFill>
@@ -7907,8 +8055,8 @@
         </p:nvSpPr>
         <p:spPr>
           <a:xfrm>
-            <a:off x="5448953" y="324546"/>
-            <a:ext cx="1611086" cy="336467"/>
+            <a:off x="4240658" y="355618"/>
+            <a:ext cx="437800" cy="336467"/>
           </a:xfrm>
           <a:prstGeom prst="roundRect">
             <a:avLst/>
@@ -7947,12 +8095,12 @@
           <a:p>
             <a:pPr algn="ctr"/>
             <a:r>
-              <a:rPr lang="en-US" sz="1801">
+              <a:rPr lang="en-US" sz="1801" dirty="0">
                 <a:solidFill>
                   <a:schemeClr val="tx1"/>
                 </a:solidFill>
               </a:rPr>
-              <a:t>Dinsdag</a:t>
+              <a:t>D</a:t>
             </a:r>
             <a:endParaRPr lang="nl-BE" sz="1801" dirty="0">
               <a:solidFill>
@@ -8587,6 +8735,351 @@
               <a:t>v</a:t>
             </a:r>
             <a:endParaRPr lang="nl-BE" sz="3200" dirty="0"/>
+          </a:p>
+        </p:txBody>
+      </p:sp>
+      <p:sp>
+        <p:nvSpPr>
+          <p:cNvPr id="2" name="Rechthoek: afgeronde hoeken 1">
+            <a:extLst>
+              <a:ext uri="{FF2B5EF4-FFF2-40B4-BE49-F238E27FC236}">
+                <a16:creationId xmlns:a16="http://schemas.microsoft.com/office/drawing/2014/main" id="{83CEDAEF-C31A-3E07-D58B-E95B786D2499}"/>
+              </a:ext>
+            </a:extLst>
+          </p:cNvPr>
+          <p:cNvSpPr/>
+          <p:nvPr/>
+        </p:nvSpPr>
+        <p:spPr>
+          <a:xfrm>
+            <a:off x="4790769" y="355618"/>
+            <a:ext cx="437800" cy="336467"/>
+          </a:xfrm>
+          <a:prstGeom prst="roundRect">
+            <a:avLst/>
+          </a:prstGeom>
+          <a:solidFill>
+            <a:schemeClr val="accent3">
+              <a:lumMod val="40000"/>
+              <a:lumOff val="60000"/>
+            </a:schemeClr>
+          </a:solidFill>
+          <a:ln>
+            <a:solidFill>
+              <a:schemeClr val="tx1"/>
+            </a:solidFill>
+          </a:ln>
+        </p:spPr>
+        <p:style>
+          <a:lnRef idx="2">
+            <a:schemeClr val="accent1">
+              <a:shade val="15000"/>
+            </a:schemeClr>
+          </a:lnRef>
+          <a:fillRef idx="1">
+            <a:schemeClr val="accent1"/>
+          </a:fillRef>
+          <a:effectRef idx="0">
+            <a:schemeClr val="accent1"/>
+          </a:effectRef>
+          <a:fontRef idx="minor">
+            <a:schemeClr val="lt1"/>
+          </a:fontRef>
+        </p:style>
+        <p:txBody>
+          <a:bodyPr rtlCol="0" anchor="ctr"/>
+          <a:lstStyle/>
+          <a:p>
+            <a:pPr algn="ctr"/>
+            <a:r>
+              <a:rPr lang="en-US" sz="1801" dirty="0">
+                <a:solidFill>
+                  <a:schemeClr val="tx1"/>
+                </a:solidFill>
+              </a:rPr>
+              <a:t>W</a:t>
+            </a:r>
+            <a:endParaRPr lang="nl-BE" sz="1801" dirty="0">
+              <a:solidFill>
+                <a:schemeClr val="tx1"/>
+              </a:solidFill>
+            </a:endParaRPr>
+          </a:p>
+        </p:txBody>
+      </p:sp>
+      <p:sp>
+        <p:nvSpPr>
+          <p:cNvPr id="3" name="Rechthoek: afgeronde hoeken 2">
+            <a:extLst>
+              <a:ext uri="{FF2B5EF4-FFF2-40B4-BE49-F238E27FC236}">
+                <a16:creationId xmlns:a16="http://schemas.microsoft.com/office/drawing/2014/main" id="{0B873A19-9D6D-9304-EFAE-37ABBA2E86D5}"/>
+              </a:ext>
+            </a:extLst>
+          </p:cNvPr>
+          <p:cNvSpPr/>
+          <p:nvPr/>
+        </p:nvSpPr>
+        <p:spPr>
+          <a:xfrm>
+            <a:off x="5340880" y="355618"/>
+            <a:ext cx="437800" cy="336467"/>
+          </a:xfrm>
+          <a:prstGeom prst="roundRect">
+            <a:avLst/>
+          </a:prstGeom>
+          <a:solidFill>
+            <a:schemeClr val="accent3">
+              <a:lumMod val="40000"/>
+              <a:lumOff val="60000"/>
+            </a:schemeClr>
+          </a:solidFill>
+          <a:ln>
+            <a:solidFill>
+              <a:schemeClr val="tx1"/>
+            </a:solidFill>
+          </a:ln>
+        </p:spPr>
+        <p:style>
+          <a:lnRef idx="2">
+            <a:schemeClr val="accent1">
+              <a:shade val="15000"/>
+            </a:schemeClr>
+          </a:lnRef>
+          <a:fillRef idx="1">
+            <a:schemeClr val="accent1"/>
+          </a:fillRef>
+          <a:effectRef idx="0">
+            <a:schemeClr val="accent1"/>
+          </a:effectRef>
+          <a:fontRef idx="minor">
+            <a:schemeClr val="lt1"/>
+          </a:fontRef>
+        </p:style>
+        <p:txBody>
+          <a:bodyPr rtlCol="0" anchor="ctr"/>
+          <a:lstStyle/>
+          <a:p>
+            <a:pPr algn="ctr"/>
+            <a:r>
+              <a:rPr lang="en-US" sz="1801" dirty="0">
+                <a:solidFill>
+                  <a:schemeClr val="tx1"/>
+                </a:solidFill>
+              </a:rPr>
+              <a:t>D</a:t>
+            </a:r>
+            <a:endParaRPr lang="nl-BE" sz="1801" dirty="0">
+              <a:solidFill>
+                <a:schemeClr val="tx1"/>
+              </a:solidFill>
+            </a:endParaRPr>
+          </a:p>
+        </p:txBody>
+      </p:sp>
+      <p:sp>
+        <p:nvSpPr>
+          <p:cNvPr id="7" name="Rechthoek: afgeronde hoeken 6">
+            <a:extLst>
+              <a:ext uri="{FF2B5EF4-FFF2-40B4-BE49-F238E27FC236}">
+                <a16:creationId xmlns:a16="http://schemas.microsoft.com/office/drawing/2014/main" id="{4F630E70-528F-C760-A1AF-9A6CC800C6FF}"/>
+              </a:ext>
+            </a:extLst>
+          </p:cNvPr>
+          <p:cNvSpPr/>
+          <p:nvPr/>
+        </p:nvSpPr>
+        <p:spPr>
+          <a:xfrm>
+            <a:off x="5890991" y="355618"/>
+            <a:ext cx="437800" cy="336467"/>
+          </a:xfrm>
+          <a:prstGeom prst="roundRect">
+            <a:avLst/>
+          </a:prstGeom>
+          <a:solidFill>
+            <a:schemeClr val="accent3">
+              <a:lumMod val="40000"/>
+              <a:lumOff val="60000"/>
+            </a:schemeClr>
+          </a:solidFill>
+          <a:ln>
+            <a:solidFill>
+              <a:schemeClr val="tx1"/>
+            </a:solidFill>
+          </a:ln>
+        </p:spPr>
+        <p:style>
+          <a:lnRef idx="2">
+            <a:schemeClr val="accent1">
+              <a:shade val="15000"/>
+            </a:schemeClr>
+          </a:lnRef>
+          <a:fillRef idx="1">
+            <a:schemeClr val="accent1"/>
+          </a:fillRef>
+          <a:effectRef idx="0">
+            <a:schemeClr val="accent1"/>
+          </a:effectRef>
+          <a:fontRef idx="minor">
+            <a:schemeClr val="lt1"/>
+          </a:fontRef>
+        </p:style>
+        <p:txBody>
+          <a:bodyPr rtlCol="0" anchor="ctr"/>
+          <a:lstStyle/>
+          <a:p>
+            <a:pPr algn="ctr"/>
+            <a:r>
+              <a:rPr lang="en-US" sz="1801" dirty="0">
+                <a:solidFill>
+                  <a:schemeClr val="tx1"/>
+                </a:solidFill>
+              </a:rPr>
+              <a:t>V</a:t>
+            </a:r>
+            <a:endParaRPr lang="nl-BE" sz="1801" dirty="0">
+              <a:solidFill>
+                <a:schemeClr val="tx1"/>
+              </a:solidFill>
+            </a:endParaRPr>
+          </a:p>
+        </p:txBody>
+      </p:sp>
+      <p:sp>
+        <p:nvSpPr>
+          <p:cNvPr id="8" name="Rechthoek: afgeronde hoeken 7">
+            <a:extLst>
+              <a:ext uri="{FF2B5EF4-FFF2-40B4-BE49-F238E27FC236}">
+                <a16:creationId xmlns:a16="http://schemas.microsoft.com/office/drawing/2014/main" id="{DBDE1729-9B09-9BCA-4E23-DAEAFA2C1518}"/>
+              </a:ext>
+            </a:extLst>
+          </p:cNvPr>
+          <p:cNvSpPr/>
+          <p:nvPr/>
+        </p:nvSpPr>
+        <p:spPr>
+          <a:xfrm>
+            <a:off x="6441102" y="355618"/>
+            <a:ext cx="437800" cy="336467"/>
+          </a:xfrm>
+          <a:prstGeom prst="roundRect">
+            <a:avLst/>
+          </a:prstGeom>
+          <a:solidFill>
+            <a:schemeClr val="accent3">
+              <a:lumMod val="40000"/>
+              <a:lumOff val="60000"/>
+            </a:schemeClr>
+          </a:solidFill>
+          <a:ln>
+            <a:solidFill>
+              <a:schemeClr val="tx1"/>
+            </a:solidFill>
+          </a:ln>
+        </p:spPr>
+        <p:style>
+          <a:lnRef idx="2">
+            <a:schemeClr val="accent1">
+              <a:shade val="15000"/>
+            </a:schemeClr>
+          </a:lnRef>
+          <a:fillRef idx="1">
+            <a:schemeClr val="accent1"/>
+          </a:fillRef>
+          <a:effectRef idx="0">
+            <a:schemeClr val="accent1"/>
+          </a:effectRef>
+          <a:fontRef idx="minor">
+            <a:schemeClr val="lt1"/>
+          </a:fontRef>
+        </p:style>
+        <p:txBody>
+          <a:bodyPr rtlCol="0" anchor="ctr"/>
+          <a:lstStyle/>
+          <a:p>
+            <a:pPr algn="ctr"/>
+            <a:r>
+              <a:rPr lang="en-US" sz="1801" dirty="0">
+                <a:solidFill>
+                  <a:schemeClr val="tx1"/>
+                </a:solidFill>
+              </a:rPr>
+              <a:t>Z</a:t>
+            </a:r>
+            <a:endParaRPr lang="nl-BE" sz="1801" dirty="0">
+              <a:solidFill>
+                <a:schemeClr val="tx1"/>
+              </a:solidFill>
+            </a:endParaRPr>
+          </a:p>
+        </p:txBody>
+      </p:sp>
+      <p:sp>
+        <p:nvSpPr>
+          <p:cNvPr id="9" name="Rechthoek: afgeronde hoeken 8">
+            <a:extLst>
+              <a:ext uri="{FF2B5EF4-FFF2-40B4-BE49-F238E27FC236}">
+                <a16:creationId xmlns:a16="http://schemas.microsoft.com/office/drawing/2014/main" id="{0F493DF0-415D-CCE8-F937-14B70683C690}"/>
+              </a:ext>
+            </a:extLst>
+          </p:cNvPr>
+          <p:cNvSpPr/>
+          <p:nvPr/>
+        </p:nvSpPr>
+        <p:spPr>
+          <a:xfrm>
+            <a:off x="6991212" y="355618"/>
+            <a:ext cx="437800" cy="336467"/>
+          </a:xfrm>
+          <a:prstGeom prst="roundRect">
+            <a:avLst/>
+          </a:prstGeom>
+          <a:solidFill>
+            <a:schemeClr val="accent3">
+              <a:lumMod val="40000"/>
+              <a:lumOff val="60000"/>
+            </a:schemeClr>
+          </a:solidFill>
+          <a:ln>
+            <a:solidFill>
+              <a:schemeClr val="tx1"/>
+            </a:solidFill>
+          </a:ln>
+        </p:spPr>
+        <p:style>
+          <a:lnRef idx="2">
+            <a:schemeClr val="accent1">
+              <a:shade val="15000"/>
+            </a:schemeClr>
+          </a:lnRef>
+          <a:fillRef idx="1">
+            <a:schemeClr val="accent1"/>
+          </a:fillRef>
+          <a:effectRef idx="0">
+            <a:schemeClr val="accent1"/>
+          </a:effectRef>
+          <a:fontRef idx="minor">
+            <a:schemeClr val="lt1"/>
+          </a:fontRef>
+        </p:style>
+        <p:txBody>
+          <a:bodyPr rtlCol="0" anchor="ctr"/>
+          <a:lstStyle/>
+          <a:p>
+            <a:pPr algn="ctr"/>
+            <a:r>
+              <a:rPr lang="en-US" sz="1801" dirty="0">
+                <a:solidFill>
+                  <a:schemeClr val="tx1"/>
+                </a:solidFill>
+              </a:rPr>
+              <a:t>Z</a:t>
+            </a:r>
+            <a:endParaRPr lang="nl-BE" sz="1801" dirty="0">
+              <a:solidFill>
+                <a:schemeClr val="tx1"/>
+              </a:solidFill>
+            </a:endParaRPr>
           </a:p>
         </p:txBody>
       </p:sp>
@@ -9805,6 +10298,158 @@
   <p:cSld>
     <p:spTree>
       <p:nvGrpSpPr>
+        <p:cNvPr id="1" name=""/>
+        <p:cNvGrpSpPr/>
+        <p:nvPr/>
+      </p:nvGrpSpPr>
+      <p:grpSpPr>
+        <a:xfrm>
+          <a:off x="0" y="0"/>
+          <a:ext cx="0" cy="0"/>
+          <a:chOff x="0" y="0"/>
+          <a:chExt cx="0" cy="0"/>
+        </a:xfrm>
+      </p:grpSpPr>
+      <p:sp>
+        <p:nvSpPr>
+          <p:cNvPr id="3" name="Tijdelijke aanduiding voor inhoud 2">
+            <a:extLst>
+              <a:ext uri="{FF2B5EF4-FFF2-40B4-BE49-F238E27FC236}">
+                <a16:creationId xmlns:a16="http://schemas.microsoft.com/office/drawing/2014/main" id="{1249AC18-616D-2996-0E28-D3E0765F1D79}"/>
+              </a:ext>
+            </a:extLst>
+          </p:cNvPr>
+          <p:cNvSpPr>
+            <a:spLocks noGrp="1"/>
+          </p:cNvSpPr>
+          <p:nvPr>
+            <p:ph idx="1"/>
+          </p:nvPr>
+        </p:nvSpPr>
+        <p:spPr/>
+        <p:txBody>
+          <a:bodyPr/>
+          <a:lstStyle/>
+          <a:p>
+            <a:endParaRPr lang="nl-BE"/>
+          </a:p>
+        </p:txBody>
+      </p:sp>
+      <mc:AlternateContent xmlns:mc="http://schemas.openxmlformats.org/markup-compatibility/2006">
+        <mc:Choice xmlns:pslz="http://schemas.microsoft.com/office/powerpoint/2016/slidezoom" Requires="pslz">
+          <p:graphicFrame>
+            <p:nvGraphicFramePr>
+              <p:cNvPr id="5" name="Diazoom 4">
+                <a:extLst>
+                  <a:ext uri="{FF2B5EF4-FFF2-40B4-BE49-F238E27FC236}">
+                    <a16:creationId xmlns:a16="http://schemas.microsoft.com/office/drawing/2014/main" id="{60A922B4-0E47-7477-8F53-8B4A641F0AE9}"/>
+                  </a:ext>
+                </a:extLst>
+              </p:cNvPr>
+              <p:cNvGraphicFramePr>
+                <a:graphicFrameLocks noChangeAspect="1"/>
+              </p:cNvGraphicFramePr>
+              <p:nvPr>
+                <p:extLst>
+                  <p:ext uri="{D42A27DB-BD31-4B8C-83A1-F6EECF244321}">
+                    <p14:modId xmlns:p14="http://schemas.microsoft.com/office/powerpoint/2010/main" val="697368226"/>
+                  </p:ext>
+                </p:extLst>
+              </p:nvPr>
+            </p:nvGraphicFramePr>
+            <p:xfrm>
+              <a:off x="762000" y="428625"/>
+              <a:ext cx="10668000" cy="6000750"/>
+            </p:xfrm>
+            <a:graphic>
+              <a:graphicData uri="http://schemas.microsoft.com/office/powerpoint/2016/slidezoom">
+                <pslz:sldZm>
+                  <pslz:sldZmObj sldId="261" cId="4064542827">
+                    <pslz:zmPr id="{D2B55231-04BA-4AFB-9811-BDE60D3EB109}" returnToParent="0" transitionDur="1000">
+                      <p166:blipFill xmlns:p166="http://schemas.microsoft.com/office/powerpoint/2016/6/main">
+                        <a:blip r:embed="rId2"/>
+                        <a:stretch>
+                          <a:fillRect/>
+                        </a:stretch>
+                      </p166:blipFill>
+                      <p166:spPr xmlns:p166="http://schemas.microsoft.com/office/powerpoint/2016/6/main">
+                        <a:xfrm>
+                          <a:off x="0" y="0"/>
+                          <a:ext cx="10668000" cy="6000750"/>
+                        </a:xfrm>
+                        <a:prstGeom prst="rect">
+                          <a:avLst/>
+                        </a:prstGeom>
+                        <a:ln w="3175">
+                          <a:solidFill>
+                            <a:prstClr val="ltGray"/>
+                          </a:solidFill>
+                        </a:ln>
+                      </p166:spPr>
+                    </pslz:zmPr>
+                  </pslz:sldZmObj>
+                </pslz:sldZm>
+              </a:graphicData>
+            </a:graphic>
+          </p:graphicFrame>
+        </mc:Choice>
+        <mc:Fallback>
+          <p:pic>
+            <p:nvPicPr>
+              <p:cNvPr id="5" name="Diazoom 4">
+                <a:hlinkClick r:id="rId3" action="ppaction://hlinksldjump"/>
+                <a:extLst>
+                  <a:ext uri="{FF2B5EF4-FFF2-40B4-BE49-F238E27FC236}">
+                    <a16:creationId xmlns:a16="http://schemas.microsoft.com/office/drawing/2014/main" id="{60A922B4-0E47-7477-8F53-8B4A641F0AE9}"/>
+                  </a:ext>
+                </a:extLst>
+              </p:cNvPr>
+              <p:cNvPicPr>
+                <a:picLocks noGrp="1" noRot="1" noChangeAspect="1" noMove="1" noResize="1" noEditPoints="1" noAdjustHandles="1" noChangeArrowheads="1" noChangeShapeType="1"/>
+              </p:cNvPicPr>
+              <p:nvPr/>
+            </p:nvPicPr>
+            <p:blipFill>
+              <a:blip r:embed="rId2"/>
+              <a:stretch>
+                <a:fillRect/>
+              </a:stretch>
+            </p:blipFill>
+            <p:spPr>
+              <a:xfrm>
+                <a:off x="762000" y="428625"/>
+                <a:ext cx="10668000" cy="6000750"/>
+              </a:xfrm>
+              <a:prstGeom prst="rect">
+                <a:avLst/>
+              </a:prstGeom>
+              <a:ln w="3175">
+                <a:solidFill>
+                  <a:prstClr val="ltGray"/>
+                </a:solidFill>
+              </a:ln>
+            </p:spPr>
+          </p:pic>
+        </mc:Fallback>
+      </mc:AlternateContent>
+    </p:spTree>
+    <p:extLst>
+      <p:ext uri="{BB962C8B-B14F-4D97-AF65-F5344CB8AC3E}">
+        <p14:creationId xmlns:p14="http://schemas.microsoft.com/office/powerpoint/2010/main" val="2181052351"/>
+      </p:ext>
+    </p:extLst>
+  </p:cSld>
+  <p:clrMapOvr>
+    <a:masterClrMapping/>
+  </p:clrMapOvr>
+</p:sld>
+</file>
+
+<file path=ppt/slides/slide8.xml><?xml version="1.0" encoding="utf-8"?>
+<p:sld xmlns:a="http://schemas.openxmlformats.org/drawingml/2006/main" xmlns:r="http://schemas.openxmlformats.org/officeDocument/2006/relationships" xmlns:p="http://schemas.openxmlformats.org/presentationml/2006/main">
+  <p:cSld>
+    <p:spTree>
+      <p:nvGrpSpPr>
         <p:cNvPr id="1" name="">
           <a:extLst>
             <a:ext uri="{FF2B5EF4-FFF2-40B4-BE49-F238E27FC236}">
@@ -9823,8 +10468,8 @@
           <a:chExt cx="0" cy="0"/>
         </a:xfrm>
       </p:grpSpPr>
-      <mc:AlternateContent xmlns:mc="http://schemas.openxmlformats.org/markup-compatibility/2006" xmlns:pslz="http://schemas.microsoft.com/office/powerpoint/2016/slidezoom">
-        <mc:Choice Requires="pslz">
+      <mc:AlternateContent xmlns:mc="http://schemas.openxmlformats.org/markup-compatibility/2006">
+        <mc:Choice xmlns:pslz="http://schemas.microsoft.com/office/powerpoint/2016/slidezoom" Requires="pslz">
           <p:graphicFrame>
             <p:nvGraphicFramePr>
               <p:cNvPr id="3" name="Diazoom 2">
@@ -9840,14 +10485,14 @@
               <p:nvPr>
                 <p:extLst>
                   <p:ext uri="{D42A27DB-BD31-4B8C-83A1-F6EECF244321}">
-                    <p14:modId xmlns:p14="http://schemas.microsoft.com/office/powerpoint/2010/main" val="3565475394"/>
+                    <p14:modId xmlns:p14="http://schemas.microsoft.com/office/powerpoint/2010/main" val="1871730150"/>
                   </p:ext>
                 </p:extLst>
               </p:nvPr>
             </p:nvGraphicFramePr>
             <p:xfrm>
-              <a:off x="1404257" y="789895"/>
-              <a:ext cx="9383486" cy="5278210"/>
+              <a:off x="427990" y="80010"/>
+              <a:ext cx="11413490" cy="6420088"/>
             </p:xfrm>
             <a:graphic>
               <a:graphicData uri="http://schemas.microsoft.com/office/powerpoint/2016/slidezoom">
@@ -9863,7 +10508,7 @@
                       <p166:spPr xmlns:p166="http://schemas.microsoft.com/office/powerpoint/2016/6/main">
                         <a:xfrm>
                           <a:off x="0" y="0"/>
-                          <a:ext cx="9383486" cy="5278210"/>
+                          <a:ext cx="11413490" cy="6420088"/>
                         </a:xfrm>
                         <a:prstGeom prst="rect">
                           <a:avLst/>
@@ -9881,7 +10526,7 @@
             </a:graphic>
           </p:graphicFrame>
         </mc:Choice>
-        <mc:Fallback xmlns="">
+        <mc:Fallback>
           <p:pic>
             <p:nvPicPr>
               <p:cNvPr id="3" name="Diazoom 2">
@@ -9898,15 +10543,15 @@
               <p:nvPr/>
             </p:nvPicPr>
             <p:blipFill>
-              <a:blip r:embed="rId4"/>
+              <a:blip r:embed="rId2"/>
               <a:stretch>
                 <a:fillRect/>
               </a:stretch>
             </p:blipFill>
             <p:spPr>
               <a:xfrm>
-                <a:off x="1404257" y="789895"/>
-                <a:ext cx="9383486" cy="5278210"/>
+                <a:off x="427990" y="80010"/>
+                <a:ext cx="11413490" cy="6420088"/>
               </a:xfrm>
               <a:prstGeom prst="rect">
                 <a:avLst/>
@@ -9945,7 +10590,7 @@
 </p:sld>
 </file>
 
-<file path=ppt/slides/slide8.xml><?xml version="1.0" encoding="utf-8"?>
+<file path=ppt/slides/slide9.xml><?xml version="1.0" encoding="utf-8"?>
 <p:sld xmlns:a="http://schemas.openxmlformats.org/drawingml/2006/main" xmlns:r="http://schemas.openxmlformats.org/officeDocument/2006/relationships" xmlns:p="http://schemas.openxmlformats.org/presentationml/2006/main">
   <p:cSld>
     <p:spTree>
@@ -10039,152 +10684,6 @@
     <p:extLst>
       <p:ext uri="{BB962C8B-B14F-4D97-AF65-F5344CB8AC3E}">
         <p14:creationId xmlns:p14="http://schemas.microsoft.com/office/powerpoint/2010/main" val="4123788425"/>
-      </p:ext>
-    </p:extLst>
-  </p:cSld>
-  <p:clrMapOvr>
-    <a:masterClrMapping/>
-  </p:clrMapOvr>
-</p:sld>
-</file>
-
-<file path=ppt/slides/slide9.xml><?xml version="1.0" encoding="utf-8"?>
-<p:sld xmlns:a="http://schemas.openxmlformats.org/drawingml/2006/main" xmlns:r="http://schemas.openxmlformats.org/officeDocument/2006/relationships" xmlns:p="http://schemas.openxmlformats.org/presentationml/2006/main">
-  <p:cSld>
-    <p:spTree>
-      <p:nvGrpSpPr>
-        <p:cNvPr id="1" name="">
-          <a:extLst>
-            <a:ext uri="{FF2B5EF4-FFF2-40B4-BE49-F238E27FC236}">
-              <a16:creationId xmlns:a16="http://schemas.microsoft.com/office/drawing/2014/main" id="{FD87F7AA-21A8-0B25-AE9D-026A87963249}"/>
-            </a:ext>
-          </a:extLst>
-        </p:cNvPr>
-        <p:cNvGrpSpPr/>
-        <p:nvPr/>
-      </p:nvGrpSpPr>
-      <p:grpSpPr>
-        <a:xfrm>
-          <a:off x="0" y="0"/>
-          <a:ext cx="0" cy="0"/>
-          <a:chOff x="0" y="0"/>
-          <a:chExt cx="0" cy="0"/>
-        </a:xfrm>
-      </p:grpSpPr>
-      <p:sp>
-        <p:nvSpPr>
-          <p:cNvPr id="2" name="Titel 1">
-            <a:extLst>
-              <a:ext uri="{FF2B5EF4-FFF2-40B4-BE49-F238E27FC236}">
-                <a16:creationId xmlns:a16="http://schemas.microsoft.com/office/drawing/2014/main" id="{FC7CEAED-74F4-03EE-8298-0990175690EC}"/>
-              </a:ext>
-            </a:extLst>
-          </p:cNvPr>
-          <p:cNvSpPr>
-            <a:spLocks noGrp="1"/>
-          </p:cNvSpPr>
-          <p:nvPr>
-            <p:ph type="title"/>
-          </p:nvPr>
-        </p:nvSpPr>
-        <p:spPr>
-          <a:xfrm>
-            <a:off x="838202" y="4933"/>
-            <a:ext cx="10515600" cy="1458119"/>
-          </a:xfrm>
-        </p:spPr>
-        <p:txBody>
-          <a:bodyPr/>
-          <a:lstStyle/>
-          <a:p>
-            <a:r>
-              <a:rPr lang="en-US" b="1" dirty="0">
-                <a:solidFill>
-                  <a:schemeClr val="bg1"/>
-                </a:solidFill>
-              </a:rPr>
-              <a:t>Build (CI/CD)</a:t>
-            </a:r>
-            <a:endParaRPr lang="nl-BE" b="1" dirty="0">
-              <a:solidFill>
-                <a:schemeClr val="bg1"/>
-              </a:solidFill>
-            </a:endParaRPr>
-          </a:p>
-        </p:txBody>
-      </p:sp>
-      <p:sp>
-        <p:nvSpPr>
-          <p:cNvPr id="5" name="Tijdelijke aanduiding voor inhoud 4">
-            <a:extLst>
-              <a:ext uri="{FF2B5EF4-FFF2-40B4-BE49-F238E27FC236}">
-                <a16:creationId xmlns:a16="http://schemas.microsoft.com/office/drawing/2014/main" id="{48598F20-39A3-FD2B-F24A-0914884E4B85}"/>
-              </a:ext>
-            </a:extLst>
-          </p:cNvPr>
-          <p:cNvSpPr>
-            <a:spLocks noGrp="1"/>
-          </p:cNvSpPr>
-          <p:nvPr>
-            <p:ph idx="1"/>
-          </p:nvPr>
-        </p:nvSpPr>
-        <p:spPr/>
-        <p:txBody>
-          <a:bodyPr/>
-          <a:lstStyle/>
-          <a:p>
-            <a:r>
-              <a:rPr lang="en-US" dirty="0">
-                <a:solidFill>
-                  <a:schemeClr val="bg1"/>
-                </a:solidFill>
-              </a:rPr>
-              <a:t>Checks?</a:t>
-            </a:r>
-          </a:p>
-          <a:p>
-            <a:r>
-              <a:rPr lang="en-US" dirty="0">
-                <a:solidFill>
-                  <a:schemeClr val="bg1"/>
-                </a:solidFill>
-              </a:rPr>
-              <a:t>Build for Mobile</a:t>
-            </a:r>
-          </a:p>
-          <a:p>
-            <a:r>
-              <a:rPr lang="en-US" dirty="0">
-                <a:solidFill>
-                  <a:schemeClr val="bg1"/>
-                </a:solidFill>
-              </a:rPr>
-              <a:t>Build for Web browser (</a:t>
-            </a:r>
-            <a:r>
-              <a:rPr lang="en-US" dirty="0" err="1">
-                <a:solidFill>
-                  <a:schemeClr val="bg1"/>
-                </a:solidFill>
-              </a:rPr>
-              <a:t>manifest.json</a:t>
-            </a:r>
-            <a:r>
-              <a:rPr lang="en-US" dirty="0">
-                <a:solidFill>
-                  <a:schemeClr val="bg1"/>
-                </a:solidFill>
-              </a:rPr>
-              <a:t>)</a:t>
-            </a:r>
-          </a:p>
-        </p:txBody>
-      </p:sp>
-    </p:spTree>
-    <p:extLst>
-      <p:ext uri="{BB962C8B-B14F-4D97-AF65-F5344CB8AC3E}">
-        <p14:creationId xmlns:p14="http://schemas.microsoft.com/office/powerpoint/2010/main" val="4118606538"/>
       </p:ext>
     </p:extLst>
   </p:cSld>

</xml_diff>